<commit_message>
updates from class, clarification, and quiz announcement
</commit_message>
<xml_diff>
--- a/format-encodings/slide_presentations/.hidden/introduction-to-encodings.pptx
+++ b/format-encodings/slide_presentations/.hidden/introduction-to-encodings.pptx
@@ -23185,7 +23185,7 @@
         </p:nvSpPr>
         <p:spPr>
           <a:xfrm>
-            <a:off x="5461733" y="2090025"/>
+            <a:off x="6296100" y="-101259"/>
             <a:ext cx="2847900" cy="1436100"/>
           </a:xfrm>
           <a:prstGeom prst="rect">
@@ -24869,11 +24869,11 @@
               <a:buChar char="●"/>
             </a:pPr>
             <a:r>
-              <a:rPr lang="en"/>
+              <a:rPr lang="en" dirty="0"/>
               <a:t>The list of </a:t>
             </a:r>
             <a:r>
-              <a:rPr lang="en" u="sng">
+              <a:rPr lang="en" u="sng" dirty="0">
                 <a:solidFill>
                   <a:schemeClr val="hlink"/>
                 </a:solidFill>
@@ -24882,7 +24882,7 @@
               <a:t>UTF-8 characters</a:t>
             </a:r>
             <a:r>
-              <a:rPr lang="en"/>
+              <a:rPr lang="en" dirty="0"/>
               <a:t>:</a:t>
             </a:r>
             <a:endParaRPr dirty="0"/>
@@ -28709,7 +28709,7 @@
         </p:nvSpPr>
         <p:spPr>
           <a:xfrm>
-            <a:off x="1277850" y="1383125"/>
+            <a:off x="1408612" y="499897"/>
             <a:ext cx="6778800" cy="652200"/>
           </a:xfrm>
           <a:prstGeom prst="rect">

</xml_diff>